<commit_message>
all-slides.pdf dynamic_programming.pdf dynamic_programming.pptx introduction.pdf introduction.pptx
</commit_message>
<xml_diff>
--- a/ipsa/slides/dynamic_programming.pptx
+++ b/ipsa/slides/dynamic_programming.pptx
@@ -138,7 +138,7 @@
 <file path=ppt/revisionInfo.xml><?xml version="1.0" encoding="utf-8"?>
 <p1510:revInfo xmlns:a="http://schemas.openxmlformats.org/drawingml/2006/main" xmlns:r="http://schemas.openxmlformats.org/officeDocument/2006/relationships" xmlns:p1510="http://schemas.microsoft.com/office/powerpoint/2015/10/main">
   <p1510:revLst>
-    <p1510:client id="{EEFC9CB5-B621-4538-9B6B-9E706B2CA24E}" v="1" dt="2024-03-19T18:48:15.392"/>
+    <p1510:client id="{231CD4DA-6602-4AAE-A1EC-6809FECBDBA5}" v="11" dt="2024-11-28T00:06:15.882"/>
   </p1510:revLst>
 </p1510:revInfo>
 </file>
@@ -538,6 +538,46 @@
       </pc:sldChg>
     </pc:docChg>
   </pc:docChgLst>
+  <pc:docChgLst>
+    <pc:chgData name="Gerth Stølting Brodal" userId="04ef4784-6591-4f86-a140-f5c3b108582a" providerId="ADAL" clId="{231CD4DA-6602-4AAE-A1EC-6809FECBDBA5}"/>
+    <pc:docChg chg="undo custSel modSld">
+      <pc:chgData name="Gerth Stølting Brodal" userId="04ef4784-6591-4f86-a140-f5c3b108582a" providerId="ADAL" clId="{231CD4DA-6602-4AAE-A1EC-6809FECBDBA5}" dt="2024-11-28T00:10:08.200" v="304" actId="20577"/>
+      <pc:docMkLst>
+        <pc:docMk/>
+      </pc:docMkLst>
+      <pc:sldChg chg="addSp modSp mod modAnim modNotesTx">
+        <pc:chgData name="Gerth Stølting Brodal" userId="04ef4784-6591-4f86-a140-f5c3b108582a" providerId="ADAL" clId="{231CD4DA-6602-4AAE-A1EC-6809FECBDBA5}" dt="2024-11-28T00:10:08.200" v="304" actId="20577"/>
+        <pc:sldMkLst>
+          <pc:docMk/>
+          <pc:sldMk cId="1651261074" sldId="768"/>
+        </pc:sldMkLst>
+        <pc:spChg chg="mod">
+          <ac:chgData name="Gerth Stølting Brodal" userId="04ef4784-6591-4f86-a140-f5c3b108582a" providerId="ADAL" clId="{231CD4DA-6602-4AAE-A1EC-6809FECBDBA5}" dt="2024-11-28T00:07:10.748" v="201" actId="1038"/>
+          <ac:spMkLst>
+            <pc:docMk/>
+            <pc:sldMk cId="1651261074" sldId="768"/>
+            <ac:spMk id="3" creationId="{00000000-0000-0000-0000-000000000000}"/>
+          </ac:spMkLst>
+        </pc:spChg>
+        <pc:spChg chg="mod">
+          <ac:chgData name="Gerth Stølting Brodal" userId="04ef4784-6591-4f86-a140-f5c3b108582a" providerId="ADAL" clId="{231CD4DA-6602-4AAE-A1EC-6809FECBDBA5}" dt="2024-11-28T00:06:01.711" v="161" actId="121"/>
+          <ac:spMkLst>
+            <pc:docMk/>
+            <pc:sldMk cId="1651261074" sldId="768"/>
+            <ac:spMk id="4" creationId="{00000000-0000-0000-0000-000000000000}"/>
+          </ac:spMkLst>
+        </pc:spChg>
+        <pc:picChg chg="add mod">
+          <ac:chgData name="Gerth Stølting Brodal" userId="04ef4784-6591-4f86-a140-f5c3b108582a" providerId="ADAL" clId="{231CD4DA-6602-4AAE-A1EC-6809FECBDBA5}" dt="2024-11-28T00:07:10.748" v="201" actId="1038"/>
+          <ac:picMkLst>
+            <pc:docMk/>
+            <pc:sldMk cId="1651261074" sldId="768"/>
+            <ac:picMk id="6" creationId="{3E906D07-6105-2BBB-7212-A41BC8F2DD55}"/>
+          </ac:picMkLst>
+        </pc:picChg>
+      </pc:sldChg>
+    </pc:docChg>
+  </pc:docChgLst>
 </pc:chgInfo>
 </file>
 
@@ -623,7 +663,7 @@
           <a:p>
             <a:fld id="{FB1A172F-81D4-4DC4-9113-1DBD56EC3646}" type="datetimeFigureOut">
               <a:rPr lang="en-US" smtClean="0"/>
-              <a:t>3/19/2024</a:t>
+              <a:t>11/28/2024</a:t>
             </a:fld>
             <a:endParaRPr lang="en-US"/>
           </a:p>
@@ -1232,6 +1272,90 @@
 </p:notes>
 </file>
 
+<file path=ppt/notesSlides/notesSlide10.xml><?xml version="1.0" encoding="utf-8"?>
+<p:notes xmlns:a="http://schemas.openxmlformats.org/drawingml/2006/main" xmlns:r="http://schemas.openxmlformats.org/officeDocument/2006/relationships" xmlns:p="http://schemas.openxmlformats.org/presentationml/2006/main">
+  <p:cSld>
+    <p:spTree>
+      <p:nvGrpSpPr>
+        <p:cNvPr id="1" name=""/>
+        <p:cNvGrpSpPr/>
+        <p:nvPr/>
+      </p:nvGrpSpPr>
+      <p:grpSpPr>
+        <a:xfrm>
+          <a:off x="0" y="0"/>
+          <a:ext cx="0" cy="0"/>
+          <a:chOff x="0" y="0"/>
+          <a:chExt cx="0" cy="0"/>
+        </a:xfrm>
+      </p:grpSpPr>
+      <p:sp>
+        <p:nvSpPr>
+          <p:cNvPr id="2" name="Slide Image Placeholder 1"/>
+          <p:cNvSpPr>
+            <a:spLocks noGrp="1" noRot="1" noChangeAspect="1"/>
+          </p:cNvSpPr>
+          <p:nvPr>
+            <p:ph type="sldImg"/>
+          </p:nvPr>
+        </p:nvSpPr>
+        <p:spPr/>
+      </p:sp>
+      <p:sp>
+        <p:nvSpPr>
+          <p:cNvPr id="3" name="Notes Placeholder 2"/>
+          <p:cNvSpPr>
+            <a:spLocks noGrp="1"/>
+          </p:cNvSpPr>
+          <p:nvPr>
+            <p:ph type="body" idx="1"/>
+          </p:nvPr>
+        </p:nvSpPr>
+        <p:spPr/>
+        <p:txBody>
+          <a:bodyPr/>
+          <a:lstStyle/>
+          <a:p>
+            <a:endParaRPr lang="en-US" dirty="0"/>
+          </a:p>
+        </p:txBody>
+      </p:sp>
+      <p:sp>
+        <p:nvSpPr>
+          <p:cNvPr id="4" name="Slide Number Placeholder 3"/>
+          <p:cNvSpPr>
+            <a:spLocks noGrp="1"/>
+          </p:cNvSpPr>
+          <p:nvPr>
+            <p:ph type="sldNum" sz="quarter" idx="10"/>
+          </p:nvPr>
+        </p:nvSpPr>
+        <p:spPr/>
+        <p:txBody>
+          <a:bodyPr/>
+          <a:lstStyle/>
+          <a:p>
+            <a:fld id="{CD563DD8-32AB-41BE-B1C6-8EAC45222ACE}" type="slidenum">
+              <a:rPr lang="en-US" smtClean="0"/>
+              <a:t>20</a:t>
+            </a:fld>
+            <a:endParaRPr lang="en-US"/>
+          </a:p>
+        </p:txBody>
+      </p:sp>
+    </p:spTree>
+    <p:extLst>
+      <p:ext uri="{BB962C8B-B14F-4D97-AF65-F5344CB8AC3E}">
+        <p14:creationId xmlns:p14="http://schemas.microsoft.com/office/powerpoint/2010/main" val="1784339401"/>
+      </p:ext>
+    </p:extLst>
+  </p:cSld>
+  <p:clrMapOvr>
+    <a:masterClrMapping/>
+  </p:clrMapOvr>
+</p:notes>
+</file>
+
 <file path=ppt/notesSlides/notesSlide2.xml><?xml version="1.0" encoding="utf-8"?>
 <p:notes xmlns:a="http://schemas.openxmlformats.org/drawingml/2006/main" xmlns:r="http://schemas.openxmlformats.org/officeDocument/2006/relationships" xmlns:p="http://schemas.openxmlformats.org/presentationml/2006/main">
   <p:cSld>
@@ -1276,30 +1400,6 @@
           <a:bodyPr/>
           <a:lstStyle/>
           <a:p>
-            <a:r>
-              <a:rPr lang="en-US" dirty="0"/>
-              <a:t>requires </a:t>
-            </a:r>
-            <a:r>
-              <a:rPr lang="en-US" dirty="0" err="1"/>
-              <a:t>args</a:t>
-            </a:r>
-            <a:r>
-              <a:rPr lang="en-US" dirty="0"/>
-              <a:t> to be immutable &amp; </a:t>
-            </a:r>
-            <a:r>
-              <a:rPr lang="en-US" dirty="0" err="1"/>
-              <a:t>hashable</a:t>
-            </a:r>
-            <a:r>
-              <a:rPr lang="en-US" dirty="0"/>
-              <a:t>, since they</a:t>
-            </a:r>
-            <a:r>
-              <a:rPr lang="en-US" baseline="0" dirty="0"/>
-              <a:t> should be used as keys into a dictionary</a:t>
-            </a:r>
             <a:endParaRPr lang="en-US" dirty="0"/>
           </a:p>
         </p:txBody>
@@ -1311,7 +1411,7 @@
             <a:spLocks noGrp="1"/>
           </p:cNvSpPr>
           <p:nvPr>
-            <p:ph type="sldNum" sz="quarter" idx="10"/>
+            <p:ph type="sldNum" sz="quarter" idx="5"/>
           </p:nvPr>
         </p:nvSpPr>
         <p:spPr/>
@@ -1321,7 +1421,7 @@
           <a:p>
             <a:fld id="{CD563DD8-32AB-41BE-B1C6-8EAC45222ACE}" type="slidenum">
               <a:rPr lang="en-US" smtClean="0"/>
-              <a:t>6</a:t>
+              <a:t>5</a:t>
             </a:fld>
             <a:endParaRPr lang="en-US"/>
           </a:p>
@@ -1330,7 +1430,7 @@
     </p:spTree>
     <p:extLst>
       <p:ext uri="{BB962C8B-B14F-4D97-AF65-F5344CB8AC3E}">
-        <p14:creationId xmlns:p14="http://schemas.microsoft.com/office/powerpoint/2010/main" val="920594807"/>
+        <p14:creationId xmlns:p14="http://schemas.microsoft.com/office/powerpoint/2010/main" val="173490946"/>
       </p:ext>
     </p:extLst>
   </p:cSld>
@@ -1386,27 +1486,27 @@
           <a:p>
             <a:r>
               <a:rPr lang="en-US" dirty="0"/>
-              <a:t>If @trace and</a:t>
+              <a:t>requires </a:t>
+            </a:r>
+            <a:r>
+              <a:rPr lang="en-US" dirty="0" err="1"/>
+              <a:t>args</a:t>
+            </a:r>
+            <a:r>
+              <a:rPr lang="en-US" dirty="0"/>
+              <a:t> to be immutable &amp; </a:t>
+            </a:r>
+            <a:r>
+              <a:rPr lang="en-US" dirty="0" err="1"/>
+              <a:t>hashable</a:t>
+            </a:r>
+            <a:r>
+              <a:rPr lang="en-US" dirty="0"/>
+              <a:t>, since they</a:t>
             </a:r>
             <a:r>
               <a:rPr lang="en-US" baseline="0" dirty="0"/>
-              <a:t> @</a:t>
-            </a:r>
-            <a:r>
-              <a:rPr lang="en-US" baseline="0" dirty="0" err="1"/>
-              <a:t>memoize</a:t>
-            </a:r>
-            <a:r>
-              <a:rPr lang="en-US" baseline="0" dirty="0"/>
-              <a:t> are swapped then the function name printed in the last column is “binomial” instead of “</a:t>
-            </a:r>
-            <a:r>
-              <a:rPr lang="en-US" baseline="0" dirty="0" err="1"/>
-              <a:t>binomial_memoize</a:t>
-            </a:r>
-            <a:r>
-              <a:rPr lang="en-US" baseline="0" dirty="0"/>
-              <a:t>”</a:t>
+              <a:t> should be used as keys into a dictionary</a:t>
             </a:r>
             <a:endParaRPr lang="en-US" dirty="0"/>
           </a:p>
@@ -1429,7 +1529,7 @@
           <a:p>
             <a:fld id="{CD563DD8-32AB-41BE-B1C6-8EAC45222ACE}" type="slidenum">
               <a:rPr lang="en-US" smtClean="0"/>
-              <a:t>7</a:t>
+              <a:t>6</a:t>
             </a:fld>
             <a:endParaRPr lang="en-US"/>
           </a:p>
@@ -1438,7 +1538,7 @@
     </p:spTree>
     <p:extLst>
       <p:ext uri="{BB962C8B-B14F-4D97-AF65-F5344CB8AC3E}">
-        <p14:creationId xmlns:p14="http://schemas.microsoft.com/office/powerpoint/2010/main" val="3182379233"/>
+        <p14:creationId xmlns:p14="http://schemas.microsoft.com/office/powerpoint/2010/main" val="920594807"/>
       </p:ext>
     </p:extLst>
   </p:cSld>
@@ -1494,24 +1594,29 @@
           <a:p>
             <a:r>
               <a:rPr lang="en-US" dirty="0"/>
-              <a:t>The </a:t>
-            </a:r>
-            <a:r>
-              <a:rPr lang="en-US" dirty="0" err="1"/>
-              <a:t>func</a:t>
-            </a:r>
-            <a:r>
-              <a:rPr lang="en-US" dirty="0"/>
-              <a:t> tools decorators also inhere in the docstrings (.__doc__), such that help and </a:t>
-            </a:r>
-            <a:r>
-              <a:rPr lang="en-US" dirty="0" err="1"/>
-              <a:t>doctest</a:t>
-            </a:r>
-            <a:r>
-              <a:rPr lang="en-US" dirty="0"/>
-              <a:t> also work.</a:t>
-            </a:r>
+              <a:t>If @trace and</a:t>
+            </a:r>
+            <a:r>
+              <a:rPr lang="en-US" baseline="0" dirty="0"/>
+              <a:t> @</a:t>
+            </a:r>
+            <a:r>
+              <a:rPr lang="en-US" baseline="0" dirty="0" err="1"/>
+              <a:t>memoize</a:t>
+            </a:r>
+            <a:r>
+              <a:rPr lang="en-US" baseline="0" dirty="0"/>
+              <a:t> are swapped then the function name printed in the last column is “binomial” instead of “</a:t>
+            </a:r>
+            <a:r>
+              <a:rPr lang="en-US" baseline="0" dirty="0" err="1"/>
+              <a:t>binomial_memoize</a:t>
+            </a:r>
+            <a:r>
+              <a:rPr lang="en-US" baseline="0" dirty="0"/>
+              <a:t>”</a:t>
+            </a:r>
+            <a:endParaRPr lang="en-US" dirty="0"/>
           </a:p>
         </p:txBody>
       </p:sp>
@@ -1522,7 +1627,7 @@
             <a:spLocks noGrp="1"/>
           </p:cNvSpPr>
           <p:nvPr>
-            <p:ph type="sldNum" sz="quarter" idx="5"/>
+            <p:ph type="sldNum" sz="quarter" idx="10"/>
           </p:nvPr>
         </p:nvSpPr>
         <p:spPr/>
@@ -1532,7 +1637,7 @@
           <a:p>
             <a:fld id="{CD563DD8-32AB-41BE-B1C6-8EAC45222ACE}" type="slidenum">
               <a:rPr lang="en-US" smtClean="0"/>
-              <a:t>8</a:t>
+              <a:t>7</a:t>
             </a:fld>
             <a:endParaRPr lang="en-US"/>
           </a:p>
@@ -1541,7 +1646,7 @@
     </p:spTree>
     <p:extLst>
       <p:ext uri="{BB962C8B-B14F-4D97-AF65-F5344CB8AC3E}">
-        <p14:creationId xmlns:p14="http://schemas.microsoft.com/office/powerpoint/2010/main" val="1786853862"/>
+        <p14:creationId xmlns:p14="http://schemas.microsoft.com/office/powerpoint/2010/main" val="3182379233"/>
       </p:ext>
     </p:extLst>
   </p:cSld>
@@ -1597,9 +1702,53 @@
           <a:p>
             <a:r>
               <a:rPr lang="en-US" dirty="0"/>
-              <a:t>Exercise 13.4 asks you to return the subset equal to x, and to use an exception to stop the recursion</a:t>
-            </a:r>
-            <a:endParaRPr lang="da-DK" dirty="0"/>
+              <a:t>The </a:t>
+            </a:r>
+            <a:r>
+              <a:rPr lang="en-US" dirty="0" err="1"/>
+              <a:t>functools</a:t>
+            </a:r>
+            <a:r>
+              <a:rPr lang="en-US" dirty="0"/>
+              <a:t> decorators also inhere in the docstrings (.__doc__), such that help and </a:t>
+            </a:r>
+            <a:r>
+              <a:rPr lang="en-US" dirty="0" err="1"/>
+              <a:t>doctest</a:t>
+            </a:r>
+            <a:r>
+              <a:rPr lang="en-US" dirty="0"/>
+              <a:t> also work.</a:t>
+            </a:r>
+          </a:p>
+          <a:p>
+            <a:endParaRPr lang="en-US" dirty="0"/>
+          </a:p>
+          <a:p>
+            <a:r>
+              <a:rPr lang="en-US" dirty="0"/>
+              <a:t>Technical issue with </a:t>
+            </a:r>
+            <a:r>
+              <a:rPr lang="en-US" dirty="0" err="1"/>
+              <a:t>functools.cache</a:t>
+            </a:r>
+            <a:r>
+              <a:rPr lang="en-US" dirty="0"/>
+              <a:t> and increasing the </a:t>
+            </a:r>
+            <a:r>
+              <a:rPr lang="en-US" dirty="0" err="1"/>
+              <a:t>recursionlimit</a:t>
+            </a:r>
+            <a:r>
+              <a:rPr lang="en-US"/>
+              <a:t>: https</a:t>
+            </a:r>
+            <a:r>
+              <a:rPr lang="en-US" dirty="0"/>
+              <a:t>://github.com/python/cpython/issues/112215</a:t>
+            </a:r>
           </a:p>
         </p:txBody>
       </p:sp>
@@ -1620,7 +1769,7 @@
           <a:p>
             <a:fld id="{CD563DD8-32AB-41BE-B1C6-8EAC45222ACE}" type="slidenum">
               <a:rPr lang="en-US" smtClean="0"/>
-              <a:t>9</a:t>
+              <a:t>8</a:t>
             </a:fld>
             <a:endParaRPr lang="en-US"/>
           </a:p>
@@ -1629,7 +1778,7 @@
     </p:spTree>
     <p:extLst>
       <p:ext uri="{BB962C8B-B14F-4D97-AF65-F5344CB8AC3E}">
-        <p14:creationId xmlns:p14="http://schemas.microsoft.com/office/powerpoint/2010/main" val="3466055033"/>
+        <p14:creationId xmlns:p14="http://schemas.microsoft.com/office/powerpoint/2010/main" val="1786853862"/>
       </p:ext>
     </p:extLst>
   </p:cSld>
@@ -1685,15 +1834,7 @@
           <a:p>
             <a:r>
               <a:rPr lang="en-US" dirty="0"/>
-              <a:t>Algorithm likely only useful when </a:t>
-            </a:r>
-            <a:r>
-              <a:rPr lang="en-US" dirty="0" err="1"/>
-              <a:t>len</a:t>
-            </a:r>
-            <a:r>
-              <a:rPr lang="en-US" dirty="0"/>
-              <a:t>(L)*sum(L) is small</a:t>
+              <a:t>Exercise 13.4 asks you to return the subset equal to x, and to use an exception to stop the recursion</a:t>
             </a:r>
             <a:endParaRPr lang="da-DK" dirty="0"/>
           </a:p>
@@ -1716,7 +1857,7 @@
           <a:p>
             <a:fld id="{CD563DD8-32AB-41BE-B1C6-8EAC45222ACE}" type="slidenum">
               <a:rPr lang="en-US" smtClean="0"/>
-              <a:t>11</a:t>
+              <a:t>9</a:t>
             </a:fld>
             <a:endParaRPr lang="en-US"/>
           </a:p>
@@ -1725,7 +1866,7 @@
     </p:spTree>
     <p:extLst>
       <p:ext uri="{BB962C8B-B14F-4D97-AF65-F5344CB8AC3E}">
-        <p14:creationId xmlns:p14="http://schemas.microsoft.com/office/powerpoint/2010/main" val="1933966232"/>
+        <p14:creationId xmlns:p14="http://schemas.microsoft.com/office/powerpoint/2010/main" val="3466055033"/>
       </p:ext>
     </p:extLst>
   </p:cSld>
@@ -1781,25 +1922,17 @@
           <a:p>
             <a:r>
               <a:rPr lang="en-US" dirty="0"/>
-              <a:t>Essentially the </a:t>
+              <a:t>Algorithm likely only useful when </a:t>
             </a:r>
             <a:r>
               <a:rPr lang="en-US" dirty="0" err="1"/>
-              <a:t>memoization</a:t>
-            </a:r>
-            <a:r>
-              <a:rPr lang="en-US" baseline="0" dirty="0"/>
-              <a:t> should keep track of all </a:t>
-            </a:r>
-            <a:r>
-              <a:rPr lang="en-US" b="1" baseline="0" dirty="0" err="1"/>
-              <a:t>subproblems</a:t>
-            </a:r>
-            <a:r>
-              <a:rPr lang="en-US" b="1" baseline="0" dirty="0"/>
-              <a:t> with no solution</a:t>
-            </a:r>
-            <a:endParaRPr lang="en-US" b="1" dirty="0"/>
+              <a:t>len</a:t>
+            </a:r>
+            <a:r>
+              <a:rPr lang="en-US" dirty="0"/>
+              <a:t>(L)*sum(L) is small</a:t>
+            </a:r>
+            <a:endParaRPr lang="da-DK" dirty="0"/>
           </a:p>
         </p:txBody>
       </p:sp>
@@ -1810,7 +1943,7 @@
             <a:spLocks noGrp="1"/>
           </p:cNvSpPr>
           <p:nvPr>
-            <p:ph type="sldNum" sz="quarter" idx="10"/>
+            <p:ph type="sldNum" sz="quarter" idx="5"/>
           </p:nvPr>
         </p:nvSpPr>
         <p:spPr/>
@@ -1820,7 +1953,7 @@
           <a:p>
             <a:fld id="{CD563DD8-32AB-41BE-B1C6-8EAC45222ACE}" type="slidenum">
               <a:rPr lang="en-US" smtClean="0"/>
-              <a:t>12</a:t>
+              <a:t>11</a:t>
             </a:fld>
             <a:endParaRPr lang="en-US"/>
           </a:p>
@@ -1829,7 +1962,7 @@
     </p:spTree>
     <p:extLst>
       <p:ext uri="{BB962C8B-B14F-4D97-AF65-F5344CB8AC3E}">
-        <p14:creationId xmlns:p14="http://schemas.microsoft.com/office/powerpoint/2010/main" val="2387255200"/>
+        <p14:creationId xmlns:p14="http://schemas.microsoft.com/office/powerpoint/2010/main" val="1933966232"/>
       </p:ext>
     </p:extLst>
   </p:cSld>
@@ -1884,78 +2017,26 @@
           <a:lstStyle/>
           <a:p>
             <a:r>
-              <a:rPr lang="da-DK" dirty="0"/>
-              <a:t>(4) </a:t>
-            </a:r>
-            <a:r>
-              <a:rPr lang="da-DK" dirty="0" err="1"/>
-              <a:t>Compute</a:t>
-            </a:r>
-            <a:r>
-              <a:rPr lang="da-DK" dirty="0"/>
-              <a:t> right-to-</a:t>
-            </a:r>
-            <a:r>
-              <a:rPr lang="da-DK" dirty="0" err="1"/>
-              <a:t>left</a:t>
-            </a:r>
-            <a:r>
-              <a:rPr lang="da-DK" dirty="0"/>
-              <a:t> </a:t>
-            </a:r>
-            <a:r>
-              <a:rPr lang="da-DK" dirty="0" err="1"/>
-              <a:t>since</a:t>
-            </a:r>
-            <a:r>
-              <a:rPr lang="da-DK" dirty="0"/>
-              <a:t> </a:t>
-            </a:r>
-            <a:r>
-              <a:rPr lang="da-DK" dirty="0" err="1"/>
-              <a:t>we</a:t>
-            </a:r>
-            <a:r>
-              <a:rPr lang="da-DK" dirty="0"/>
-              <a:t> </a:t>
-            </a:r>
-            <a:r>
-              <a:rPr lang="da-DK" dirty="0" err="1"/>
-              <a:t>are</a:t>
-            </a:r>
-            <a:r>
-              <a:rPr lang="da-DK" dirty="0"/>
-              <a:t> </a:t>
-            </a:r>
-            <a:r>
-              <a:rPr lang="da-DK" dirty="0" err="1"/>
-              <a:t>overwritting</a:t>
-            </a:r>
-            <a:r>
-              <a:rPr lang="da-DK" dirty="0"/>
-              <a:t> </a:t>
-            </a:r>
-            <a:r>
-              <a:rPr lang="da-DK" dirty="0" err="1"/>
-              <a:t>previous</a:t>
-            </a:r>
-            <a:r>
-              <a:rPr lang="da-DK" dirty="0"/>
-              <a:t> </a:t>
-            </a:r>
-            <a:r>
-              <a:rPr lang="da-DK" dirty="0" err="1"/>
-              <a:t>row</a:t>
-            </a:r>
-            <a:r>
-              <a:rPr lang="da-DK" dirty="0"/>
-              <a:t> with new </a:t>
-            </a:r>
-            <a:r>
-              <a:rPr lang="da-DK" dirty="0" err="1"/>
-              <a:t>values</a:t>
-            </a:r>
-            <a:endParaRPr lang="da-DK" dirty="0"/>
+              <a:rPr lang="en-US" dirty="0"/>
+              <a:t>Essentially the </a:t>
+            </a:r>
+            <a:r>
+              <a:rPr lang="en-US" dirty="0" err="1"/>
+              <a:t>memoization</a:t>
+            </a:r>
+            <a:r>
+              <a:rPr lang="en-US" baseline="0" dirty="0"/>
+              <a:t> should keep track of all </a:t>
+            </a:r>
+            <a:r>
+              <a:rPr lang="en-US" b="1" baseline="0" dirty="0" err="1"/>
+              <a:t>subproblems</a:t>
+            </a:r>
+            <a:r>
+              <a:rPr lang="en-US" b="1" baseline="0" dirty="0"/>
+              <a:t> with no solution</a:t>
+            </a:r>
+            <a:endParaRPr lang="en-US" b="1" dirty="0"/>
           </a:p>
         </p:txBody>
       </p:sp>
@@ -1966,7 +2047,7 @@
             <a:spLocks noGrp="1"/>
           </p:cNvSpPr>
           <p:nvPr>
-            <p:ph type="sldNum" sz="quarter" idx="5"/>
+            <p:ph type="sldNum" sz="quarter" idx="10"/>
           </p:nvPr>
         </p:nvSpPr>
         <p:spPr/>
@@ -1976,7 +2057,7 @@
           <a:p>
             <a:fld id="{CD563DD8-32AB-41BE-B1C6-8EAC45222ACE}" type="slidenum">
               <a:rPr lang="en-US" smtClean="0"/>
-              <a:t>17</a:t>
+              <a:t>12</a:t>
             </a:fld>
             <a:endParaRPr lang="en-US"/>
           </a:p>
@@ -1985,7 +2066,7 @@
     </p:spTree>
     <p:extLst>
       <p:ext uri="{BB962C8B-B14F-4D97-AF65-F5344CB8AC3E}">
-        <p14:creationId xmlns:p14="http://schemas.microsoft.com/office/powerpoint/2010/main" val="2332366075"/>
+        <p14:creationId xmlns:p14="http://schemas.microsoft.com/office/powerpoint/2010/main" val="2387255200"/>
       </p:ext>
     </p:extLst>
   </p:cSld>
@@ -2039,7 +2120,79 @@
           <a:bodyPr/>
           <a:lstStyle/>
           <a:p>
-            <a:endParaRPr lang="en-US" dirty="0"/>
+            <a:r>
+              <a:rPr lang="da-DK" dirty="0"/>
+              <a:t>(4) </a:t>
+            </a:r>
+            <a:r>
+              <a:rPr lang="da-DK" dirty="0" err="1"/>
+              <a:t>Compute</a:t>
+            </a:r>
+            <a:r>
+              <a:rPr lang="da-DK" dirty="0"/>
+              <a:t> right-to-</a:t>
+            </a:r>
+            <a:r>
+              <a:rPr lang="da-DK" dirty="0" err="1"/>
+              <a:t>left</a:t>
+            </a:r>
+            <a:r>
+              <a:rPr lang="da-DK" dirty="0"/>
+              <a:t> </a:t>
+            </a:r>
+            <a:r>
+              <a:rPr lang="da-DK" dirty="0" err="1"/>
+              <a:t>since</a:t>
+            </a:r>
+            <a:r>
+              <a:rPr lang="da-DK" dirty="0"/>
+              <a:t> </a:t>
+            </a:r>
+            <a:r>
+              <a:rPr lang="da-DK" dirty="0" err="1"/>
+              <a:t>we</a:t>
+            </a:r>
+            <a:r>
+              <a:rPr lang="da-DK" dirty="0"/>
+              <a:t> </a:t>
+            </a:r>
+            <a:r>
+              <a:rPr lang="da-DK" dirty="0" err="1"/>
+              <a:t>are</a:t>
+            </a:r>
+            <a:r>
+              <a:rPr lang="da-DK" dirty="0"/>
+              <a:t> </a:t>
+            </a:r>
+            <a:r>
+              <a:rPr lang="da-DK" dirty="0" err="1"/>
+              <a:t>overwritting</a:t>
+            </a:r>
+            <a:r>
+              <a:rPr lang="da-DK" dirty="0"/>
+              <a:t> </a:t>
+            </a:r>
+            <a:r>
+              <a:rPr lang="da-DK" dirty="0" err="1"/>
+              <a:t>previous</a:t>
+            </a:r>
+            <a:r>
+              <a:rPr lang="da-DK" dirty="0"/>
+              <a:t> </a:t>
+            </a:r>
+            <a:r>
+              <a:rPr lang="da-DK" dirty="0" err="1"/>
+              <a:t>row</a:t>
+            </a:r>
+            <a:r>
+              <a:rPr lang="da-DK" dirty="0"/>
+              <a:t> with new </a:t>
+            </a:r>
+            <a:r>
+              <a:rPr lang="da-DK" dirty="0" err="1"/>
+              <a:t>values</a:t>
+            </a:r>
+            <a:endParaRPr lang="da-DK" dirty="0"/>
           </a:p>
         </p:txBody>
       </p:sp>
@@ -2050,7 +2203,7 @@
             <a:spLocks noGrp="1"/>
           </p:cNvSpPr>
           <p:nvPr>
-            <p:ph type="sldNum" sz="quarter" idx="10"/>
+            <p:ph type="sldNum" sz="quarter" idx="5"/>
           </p:nvPr>
         </p:nvSpPr>
         <p:spPr/>
@@ -2060,7 +2213,7 @@
           <a:p>
             <a:fld id="{CD563DD8-32AB-41BE-B1C6-8EAC45222ACE}" type="slidenum">
               <a:rPr lang="en-US" smtClean="0"/>
-              <a:t>20</a:t>
+              <a:t>17</a:t>
             </a:fld>
             <a:endParaRPr lang="en-US"/>
           </a:p>
@@ -2069,7 +2222,7 @@
     </p:spTree>
     <p:extLst>
       <p:ext uri="{BB962C8B-B14F-4D97-AF65-F5344CB8AC3E}">
-        <p14:creationId xmlns:p14="http://schemas.microsoft.com/office/powerpoint/2010/main" val="1784339401"/>
+        <p14:creationId xmlns:p14="http://schemas.microsoft.com/office/powerpoint/2010/main" val="2332366075"/>
       </p:ext>
     </p:extLst>
   </p:cSld>
@@ -2216,7 +2369,7 @@
           <a:p>
             <a:fld id="{0560A9CD-0304-4E0B-9E82-E7E0115DE05B}" type="datetimeFigureOut">
               <a:rPr lang="en-US" smtClean="0"/>
-              <a:t>3/19/2024</a:t>
+              <a:t>11/28/2024</a:t>
             </a:fld>
             <a:endParaRPr lang="en-US"/>
           </a:p>
@@ -2384,7 +2537,7 @@
           <a:p>
             <a:fld id="{0560A9CD-0304-4E0B-9E82-E7E0115DE05B}" type="datetimeFigureOut">
               <a:rPr lang="en-US" smtClean="0"/>
-              <a:t>3/19/2024</a:t>
+              <a:t>11/28/2024</a:t>
             </a:fld>
             <a:endParaRPr lang="en-US"/>
           </a:p>
@@ -2562,7 +2715,7 @@
           <a:p>
             <a:fld id="{0560A9CD-0304-4E0B-9E82-E7E0115DE05B}" type="datetimeFigureOut">
               <a:rPr lang="en-US" smtClean="0"/>
-              <a:t>3/19/2024</a:t>
+              <a:t>11/28/2024</a:t>
             </a:fld>
             <a:endParaRPr lang="en-US"/>
           </a:p>
@@ -2745,7 +2898,7 @@
           <a:p>
             <a:fld id="{0560A9CD-0304-4E0B-9E82-E7E0115DE05B}" type="datetimeFigureOut">
               <a:rPr lang="en-US" smtClean="0"/>
-              <a:t>3/19/2024</a:t>
+              <a:t>11/28/2024</a:t>
             </a:fld>
             <a:endParaRPr lang="en-US"/>
           </a:p>
@@ -2990,7 +3143,7 @@
           <a:p>
             <a:fld id="{0560A9CD-0304-4E0B-9E82-E7E0115DE05B}" type="datetimeFigureOut">
               <a:rPr lang="en-US" smtClean="0"/>
-              <a:t>3/19/2024</a:t>
+              <a:t>11/28/2024</a:t>
             </a:fld>
             <a:endParaRPr lang="en-US"/>
           </a:p>
@@ -3219,7 +3372,7 @@
           <a:p>
             <a:fld id="{0560A9CD-0304-4E0B-9E82-E7E0115DE05B}" type="datetimeFigureOut">
               <a:rPr lang="en-US" smtClean="0"/>
-              <a:t>3/19/2024</a:t>
+              <a:t>11/28/2024</a:t>
             </a:fld>
             <a:endParaRPr lang="en-US"/>
           </a:p>
@@ -3583,7 +3736,7 @@
           <a:p>
             <a:fld id="{0560A9CD-0304-4E0B-9E82-E7E0115DE05B}" type="datetimeFigureOut">
               <a:rPr lang="en-US" smtClean="0"/>
-              <a:t>3/19/2024</a:t>
+              <a:t>11/28/2024</a:t>
             </a:fld>
             <a:endParaRPr lang="en-US"/>
           </a:p>
@@ -3700,7 +3853,7 @@
           <a:p>
             <a:fld id="{0560A9CD-0304-4E0B-9E82-E7E0115DE05B}" type="datetimeFigureOut">
               <a:rPr lang="en-US" smtClean="0"/>
-              <a:t>3/19/2024</a:t>
+              <a:t>11/28/2024</a:t>
             </a:fld>
             <a:endParaRPr lang="en-US"/>
           </a:p>
@@ -3795,7 +3948,7 @@
           <a:p>
             <a:fld id="{0560A9CD-0304-4E0B-9E82-E7E0115DE05B}" type="datetimeFigureOut">
               <a:rPr lang="en-US" smtClean="0"/>
-              <a:t>3/19/2024</a:t>
+              <a:t>11/28/2024</a:t>
             </a:fld>
             <a:endParaRPr lang="en-US"/>
           </a:p>
@@ -4070,7 +4223,7 @@
           <a:p>
             <a:fld id="{0560A9CD-0304-4E0B-9E82-E7E0115DE05B}" type="datetimeFigureOut">
               <a:rPr lang="en-US" smtClean="0"/>
-              <a:t>3/19/2024</a:t>
+              <a:t>11/28/2024</a:t>
             </a:fld>
             <a:endParaRPr lang="en-US"/>
           </a:p>
@@ -4322,7 +4475,7 @@
           <a:p>
             <a:fld id="{0560A9CD-0304-4E0B-9E82-E7E0115DE05B}" type="datetimeFigureOut">
               <a:rPr lang="en-US" smtClean="0"/>
-              <a:t>3/19/2024</a:t>
+              <a:t>11/28/2024</a:t>
             </a:fld>
             <a:endParaRPr lang="en-US"/>
           </a:p>
@@ -4533,7 +4686,7 @@
           <a:p>
             <a:fld id="{0560A9CD-0304-4E0B-9E82-E7E0115DE05B}" type="datetimeFigureOut">
               <a:rPr lang="en-US" smtClean="0"/>
-              <a:t>3/19/2024</a:t>
+              <a:t>11/28/2024</a:t>
             </a:fld>
             <a:endParaRPr lang="en-US"/>
           </a:p>
@@ -21631,11 +21784,11 @@
   <p:clrMapOvr>
     <a:masterClrMapping/>
   </p:clrMapOvr>
-  <mc:AlternateContent xmlns:mc="http://schemas.openxmlformats.org/markup-compatibility/2006">
-    <mc:Choice xmlns:p14="http://schemas.microsoft.com/office/powerpoint/2010/main" Requires="p14">
+  <mc:AlternateContent xmlns:mc="http://schemas.openxmlformats.org/markup-compatibility/2006" xmlns:p14="http://schemas.microsoft.com/office/powerpoint/2010/main">
+    <mc:Choice Requires="p14">
       <p:transition p14:dur="10"/>
     </mc:Choice>
-    <mc:Fallback>
+    <mc:Fallback xmlns="">
       <p:transition/>
     </mc:Fallback>
   </mc:AlternateContent>
@@ -28979,8 +29132,8 @@
         </p:nvSpPr>
         <p:spPr>
           <a:xfrm>
-            <a:off x="344889" y="4496753"/>
-            <a:ext cx="11589935" cy="1504709"/>
+            <a:off x="699757" y="4499496"/>
+            <a:ext cx="11096625" cy="2085862"/>
           </a:xfrm>
         </p:spPr>
         <p:txBody>
@@ -28990,76 +29143,76 @@
           <a:lstStyle/>
           <a:p>
             <a:r>
-              <a:rPr lang="da-DK" sz="2400" dirty="0"/>
+              <a:rPr lang="da-DK" sz="2000" dirty="0"/>
               <a:t>The </a:t>
             </a:r>
             <a:r>
-              <a:rPr lang="da-DK" sz="2400" dirty="0" err="1"/>
+              <a:rPr lang="da-DK" sz="2000" dirty="0" err="1"/>
               <a:t>decorators</a:t>
             </a:r>
             <a:r>
-              <a:rPr lang="da-DK" sz="2400" dirty="0"/>
+              <a:rPr lang="da-DK" sz="2000" dirty="0"/>
               <a:t> </a:t>
             </a:r>
             <a:r>
-              <a:rPr lang="da-DK" sz="2400" dirty="0">
+              <a:rPr lang="da-DK" sz="2000" dirty="0">
                 <a:latin typeface="Courier New" panose="02070309020205020404" pitchFamily="49" charset="0"/>
                 <a:cs typeface="Courier New" panose="02070309020205020404" pitchFamily="49" charset="0"/>
               </a:rPr>
               <a:t>@cache</a:t>
             </a:r>
             <a:r>
-              <a:rPr lang="da-DK" sz="2400" dirty="0"/>
+              <a:rPr lang="da-DK" sz="2000" dirty="0"/>
               <a:t> (</a:t>
             </a:r>
             <a:r>
-              <a:rPr lang="da-DK" sz="2400" dirty="0" err="1"/>
+              <a:rPr lang="da-DK" sz="2000" dirty="0" err="1"/>
               <a:t>since</a:t>
             </a:r>
             <a:r>
-              <a:rPr lang="da-DK" sz="2400" dirty="0"/>
+              <a:rPr lang="da-DK" sz="2000" dirty="0"/>
               <a:t> Python 3.9) and </a:t>
             </a:r>
             <a:r>
-              <a:rPr lang="da-DK" sz="2400" dirty="0">
+              <a:rPr lang="da-DK" sz="2000" dirty="0">
                 <a:latin typeface="Courier New" panose="02070309020205020404" pitchFamily="49" charset="0"/>
                 <a:cs typeface="Courier New" panose="02070309020205020404" pitchFamily="49" charset="0"/>
               </a:rPr>
               <a:t>@lru_cache(maxsize=None)</a:t>
             </a:r>
             <a:r>
-              <a:rPr lang="da-DK" sz="2400" dirty="0"/>
+              <a:rPr lang="da-DK" sz="2000" dirty="0"/>
               <a:t> in the standard </a:t>
             </a:r>
             <a:r>
-              <a:rPr lang="da-DK" sz="2400" dirty="0" err="1"/>
+              <a:rPr lang="da-DK" sz="2000" dirty="0" err="1"/>
               <a:t>library</a:t>
             </a:r>
             <a:r>
-              <a:rPr lang="da-DK" sz="2400" dirty="0"/>
+              <a:rPr lang="da-DK" sz="2000" dirty="0"/>
               <a:t> </a:t>
             </a:r>
             <a:r>
-              <a:rPr lang="da-DK" sz="2400" dirty="0" err="1">
+              <a:rPr lang="da-DK" sz="2000" dirty="0" err="1">
                 <a:latin typeface="Courier New" panose="02070309020205020404" pitchFamily="49" charset="0"/>
                 <a:cs typeface="Courier New" panose="02070309020205020404" pitchFamily="49" charset="0"/>
               </a:rPr>
               <a:t>functools</a:t>
             </a:r>
             <a:r>
-              <a:rPr lang="da-DK" sz="2400" dirty="0"/>
+              <a:rPr lang="da-DK" sz="2000" dirty="0"/>
               <a:t> supports the same as the </a:t>
             </a:r>
             <a:r>
-              <a:rPr lang="da-DK" sz="2400" dirty="0" err="1"/>
+              <a:rPr lang="da-DK" sz="2000" dirty="0" err="1"/>
               <a:t>decorator</a:t>
             </a:r>
             <a:r>
-              <a:rPr lang="da-DK" sz="2400" dirty="0"/>
+              <a:rPr lang="da-DK" sz="2000" dirty="0"/>
               <a:t> </a:t>
             </a:r>
             <a:r>
-              <a:rPr lang="da-DK" sz="2400" dirty="0">
+              <a:rPr lang="da-DK" sz="2000" dirty="0">
                 <a:solidFill>
                   <a:schemeClr val="accent1">
                     <a:lumMod val="50000"/>
@@ -29073,125 +29226,180 @@
           </a:p>
           <a:p>
             <a:r>
-              <a:rPr lang="da-DK" sz="2400" dirty="0"/>
+              <a:rPr lang="da-DK" sz="2000" dirty="0"/>
               <a:t>By default </a:t>
             </a:r>
             <a:r>
-              <a:rPr lang="da-DK" sz="2400" dirty="0">
+              <a:rPr lang="da-DK" sz="2000" dirty="0">
                 <a:latin typeface="Courier New" panose="02070309020205020404" pitchFamily="49" charset="0"/>
                 <a:cs typeface="Courier New" panose="02070309020205020404" pitchFamily="49" charset="0"/>
               </a:rPr>
               <a:t>@lru_cache </a:t>
             </a:r>
             <a:r>
-              <a:rPr lang="da-DK" sz="2400" dirty="0"/>
+              <a:rPr lang="da-DK" sz="2000" dirty="0"/>
               <a:t>at most </a:t>
             </a:r>
             <a:r>
-              <a:rPr lang="da-DK" sz="2400" dirty="0" err="1"/>
+              <a:rPr lang="da-DK" sz="2000" dirty="0" err="1"/>
               <a:t>remembers</a:t>
             </a:r>
             <a:r>
-              <a:rPr lang="da-DK" sz="2400" dirty="0"/>
+              <a:rPr lang="da-DK" sz="2000" dirty="0"/>
               <a:t> (caches) 128 </a:t>
             </a:r>
             <a:r>
-              <a:rPr lang="da-DK" sz="2400" dirty="0" err="1"/>
+              <a:rPr lang="da-DK" sz="2000" dirty="0" err="1"/>
               <a:t>previous</a:t>
             </a:r>
             <a:r>
-              <a:rPr lang="da-DK" sz="2400" dirty="0"/>
+              <a:rPr lang="da-DK" sz="2000" dirty="0"/>
               <a:t> </a:t>
             </a:r>
             <a:r>
-              <a:rPr lang="da-DK" sz="2400" dirty="0" err="1"/>
+              <a:rPr lang="da-DK" sz="2000" dirty="0" err="1"/>
               <a:t>function</a:t>
             </a:r>
             <a:r>
-              <a:rPr lang="da-DK" sz="2400" dirty="0"/>
+              <a:rPr lang="da-DK" sz="2000" dirty="0"/>
               <a:t> </a:t>
             </a:r>
             <a:r>
-              <a:rPr lang="da-DK" sz="2400" dirty="0" err="1"/>
+              <a:rPr lang="da-DK" sz="2000" dirty="0" err="1"/>
               <a:t>calls</a:t>
             </a:r>
             <a:r>
-              <a:rPr lang="da-DK" sz="2400" dirty="0"/>
+              <a:rPr lang="da-DK" sz="2000" dirty="0"/>
               <a:t>, </a:t>
             </a:r>
             <a:r>
-              <a:rPr lang="da-DK" sz="2400" dirty="0" err="1"/>
+              <a:rPr lang="da-DK" sz="2000" dirty="0" err="1"/>
               <a:t>always</a:t>
             </a:r>
             <a:r>
-              <a:rPr lang="da-DK" sz="2400" dirty="0"/>
+              <a:rPr lang="da-DK" sz="2000" dirty="0"/>
               <a:t> </a:t>
             </a:r>
             <a:r>
-              <a:rPr lang="da-DK" sz="2400" dirty="0" err="1"/>
+              <a:rPr lang="da-DK" sz="2000" dirty="0" err="1"/>
               <a:t>evicting</a:t>
             </a:r>
             <a:r>
-              <a:rPr lang="da-DK" sz="2400" dirty="0"/>
+              <a:rPr lang="da-DK" sz="2000" dirty="0"/>
               <a:t> </a:t>
             </a:r>
             <a:r>
-              <a:rPr lang="da-DK" sz="2400" b="1" dirty="0" err="1"/>
+              <a:rPr lang="da-DK" sz="2000" b="1" dirty="0" err="1"/>
               <a:t>L</a:t>
             </a:r>
             <a:r>
-              <a:rPr lang="da-DK" sz="2400" dirty="0" err="1"/>
+              <a:rPr lang="da-DK" sz="2000" dirty="0" err="1"/>
               <a:t>east</a:t>
             </a:r>
             <a:r>
-              <a:rPr lang="da-DK" sz="2400" dirty="0"/>
+              <a:rPr lang="da-DK" sz="2000" dirty="0"/>
               <a:t> </a:t>
             </a:r>
             <a:r>
-              <a:rPr lang="da-DK" sz="2400" b="1" dirty="0" err="1"/>
+              <a:rPr lang="da-DK" sz="2000" b="1" dirty="0" err="1"/>
               <a:t>R</a:t>
             </a:r>
             <a:r>
-              <a:rPr lang="da-DK" sz="2400" dirty="0" err="1"/>
+              <a:rPr lang="da-DK" sz="2000" dirty="0" err="1"/>
               <a:t>ecently</a:t>
             </a:r>
             <a:r>
-              <a:rPr lang="da-DK" sz="2400" dirty="0"/>
+              <a:rPr lang="da-DK" sz="2000" dirty="0"/>
               <a:t> </a:t>
             </a:r>
             <a:r>
-              <a:rPr lang="da-DK" sz="2400" b="1" dirty="0" err="1"/>
+              <a:rPr lang="da-DK" sz="2000" b="1" dirty="0" err="1"/>
               <a:t>U</a:t>
             </a:r>
             <a:r>
-              <a:rPr lang="da-DK" sz="2400" dirty="0" err="1"/>
+              <a:rPr lang="da-DK" sz="2000" dirty="0" err="1"/>
               <a:t>sed</a:t>
             </a:r>
             <a:r>
-              <a:rPr lang="da-DK" sz="2400" dirty="0"/>
+              <a:rPr lang="da-DK" sz="2000" dirty="0"/>
               <a:t> </a:t>
             </a:r>
             <a:r>
-              <a:rPr lang="da-DK" sz="2400" dirty="0" err="1"/>
+              <a:rPr lang="da-DK" sz="2000" dirty="0" err="1"/>
               <a:t>entries</a:t>
             </a:r>
             <a:r>
-              <a:rPr lang="da-DK" sz="2400" dirty="0"/>
+              <a:rPr lang="da-DK" sz="2000" dirty="0"/>
               <a:t> from </a:t>
             </a:r>
             <a:r>
-              <a:rPr lang="da-DK" sz="2400" dirty="0" err="1"/>
+              <a:rPr lang="da-DK" sz="2000" dirty="0" err="1"/>
               <a:t>its</a:t>
             </a:r>
             <a:r>
-              <a:rPr lang="da-DK" sz="2400" dirty="0"/>
+              <a:rPr lang="da-DK" sz="2000" dirty="0"/>
               <a:t> </a:t>
             </a:r>
             <a:r>
-              <a:rPr lang="da-DK" sz="2400" dirty="0" err="1"/>
+              <a:rPr lang="da-DK" sz="2000" dirty="0" err="1"/>
               <a:t>dictionary</a:t>
             </a:r>
-            <a:endParaRPr lang="da-DK" sz="2400" dirty="0"/>
+            <a:endParaRPr lang="da-DK" sz="2000" dirty="0"/>
+          </a:p>
+          <a:p>
+            <a:r>
+              <a:rPr lang="da-DK" sz="2000" dirty="0" err="1">
+                <a:latin typeface="Courier New" panose="02070309020205020404" pitchFamily="49" charset="0"/>
+                <a:cs typeface="Courier New" panose="02070309020205020404" pitchFamily="49" charset="0"/>
+              </a:rPr>
+              <a:t>functools.cache</a:t>
+            </a:r>
+            <a:r>
+              <a:rPr lang="da-DK" sz="2000" dirty="0"/>
+              <a:t> has problems </a:t>
+            </a:r>
+            <a:r>
+              <a:rPr lang="da-DK" sz="2000" dirty="0" err="1"/>
+              <a:t>when</a:t>
+            </a:r>
+            <a:r>
+              <a:rPr lang="da-DK" sz="2000" dirty="0"/>
+              <a:t> </a:t>
+            </a:r>
+            <a:r>
+              <a:rPr lang="da-DK" sz="2000" dirty="0" err="1"/>
+              <a:t>using</a:t>
+            </a:r>
+            <a:r>
+              <a:rPr lang="da-DK" sz="2000" dirty="0"/>
+              <a:t> </a:t>
+            </a:r>
+            <a:r>
+              <a:rPr lang="da-DK" sz="2000" dirty="0" err="1">
+                <a:latin typeface="Courier New" panose="02070309020205020404" pitchFamily="49" charset="0"/>
+                <a:cs typeface="Courier New" panose="02070309020205020404" pitchFamily="49" charset="0"/>
+              </a:rPr>
+              <a:t>sys.setrecursionlimit</a:t>
+            </a:r>
+            <a:r>
+              <a:rPr lang="da-DK" sz="2000" dirty="0"/>
+              <a:t> </a:t>
+            </a:r>
+            <a:br>
+              <a:rPr lang="da-DK" sz="2000" dirty="0"/>
+            </a:br>
+            <a:r>
+              <a:rPr lang="da-DK" sz="2000" dirty="0"/>
+              <a:t>(</a:t>
+            </a:r>
+            <a:r>
+              <a:rPr lang="da-DK" sz="2000" dirty="0" err="1"/>
+              <a:t>e.g</a:t>
+            </a:r>
+            <a:r>
+              <a:rPr lang="da-DK" sz="2000" dirty="0"/>
+              <a:t>. with Python 3.13 on Windows)</a:t>
+            </a:r>
           </a:p>
         </p:txBody>
       </p:sp>
@@ -29203,7 +29411,7 @@
         </p:nvSpPr>
         <p:spPr>
           <a:xfrm>
-            <a:off x="5988699" y="6315597"/>
+            <a:off x="5988699" y="6442619"/>
             <a:ext cx="6203301" cy="369332"/>
           </a:xfrm>
           <a:prstGeom prst="rect">
@@ -29216,6 +29424,7 @@
           </a:bodyPr>
           <a:lstStyle/>
           <a:p>
+            <a:pPr algn="r"/>
             <a:r>
               <a:rPr lang="en-US" dirty="0">
                 <a:solidFill>
@@ -29540,6 +29749,42 @@
           </a:graphicData>
         </a:graphic>
       </p:graphicFrame>
+      <p:pic>
+        <p:nvPicPr>
+          <p:cNvPr id="6" name="Picture 5">
+            <a:extLst>
+              <a:ext uri="{FF2B5EF4-FFF2-40B4-BE49-F238E27FC236}">
+                <a16:creationId xmlns:a16="http://schemas.microsoft.com/office/drawing/2014/main" id="{3E906D07-6105-2BBB-7212-A41BC8F2DD55}"/>
+              </a:ext>
+            </a:extLst>
+          </p:cNvPr>
+          <p:cNvPicPr>
+            <a:picLocks noChangeAspect="1"/>
+          </p:cNvPicPr>
+          <p:nvPr/>
+        </p:nvPicPr>
+        <p:blipFill>
+          <a:blip r:embed="rId4" cstate="print">
+            <a:extLst>
+              <a:ext uri="{28A0092B-C50C-407E-A947-70E740481C1C}">
+                <a14:useLocalDpi xmlns:a14="http://schemas.microsoft.com/office/drawing/2010/main" val="0"/>
+              </a:ext>
+            </a:extLst>
+          </a:blip>
+          <a:stretch>
+            <a:fillRect/>
+          </a:stretch>
+        </p:blipFill>
+        <p:spPr>
+          <a:xfrm>
+            <a:off x="9479583" y="5936690"/>
+            <a:ext cx="506810" cy="421838"/>
+          </a:xfrm>
+          <a:prstGeom prst="rect">
+            <a:avLst/>
+          </a:prstGeom>
+        </p:spPr>
+      </p:pic>
     </p:spTree>
     <p:extLst>
       <p:ext uri="{BB962C8B-B14F-4D97-AF65-F5344CB8AC3E}">

</xml_diff>